<commit_message>
added figures to the slideshow
</commit_message>
<xml_diff>
--- a/CRET_analysis.pptx
+++ b/CRET_analysis.pptx
@@ -5,7 +5,7 @@
     <p:sldMasterId id="2147483648" r:id="rId1"/>
   </p:sldMasterIdLst>
   <p:notesMasterIdLst>
-    <p:notesMasterId r:id="rId15"/>
+    <p:notesMasterId r:id="rId19"/>
   </p:notesMasterIdLst>
   <p:sldIdLst>
     <p:sldId id="256" r:id="rId2"/>
@@ -21,6 +21,10 @@
     <p:sldId id="260" r:id="rId12"/>
     <p:sldId id="268" r:id="rId13"/>
     <p:sldId id="264" r:id="rId14"/>
+    <p:sldId id="269" r:id="rId15"/>
+    <p:sldId id="270" r:id="rId16"/>
+    <p:sldId id="271" r:id="rId17"/>
+    <p:sldId id="272" r:id="rId18"/>
   </p:sldIdLst>
   <p:sldSz cx="12192000" cy="6858000"/>
   <p:notesSz cx="6858000" cy="9144000"/>
@@ -119,6 +123,11 @@
       </a:defRPr>
     </a:lvl9pPr>
   </p:defaultTextStyle>
+  <p:extLst>
+    <p:ext uri="{EFAFB233-063F-42B5-8137-9DF3F51BA10A}">
+      <p15:sldGuideLst xmlns:p15="http://schemas.microsoft.com/office/powerpoint/2012/main"/>
+    </p:ext>
+  </p:extLst>
 </p:presentation>
 </file>
 
@@ -204,7 +213,7 @@
           <a:p>
             <a:fld id="{0AC82701-24FA-334F-91E7-612CBA9A4EBD}" type="datetimeFigureOut">
               <a:rPr lang="en-US" smtClean="0"/>
-              <a:t>5/17/18</a:t>
+              <a:t>5/21/18</a:t>
             </a:fld>
             <a:endParaRPr lang="en-US"/>
           </a:p>
@@ -1060,15 +1069,7 @@
             </a:r>
             <a:r>
               <a:rPr lang="en-US" baseline="0" dirty="0" smtClean="0"/>
-              <a:t> fixed effect variable from the first instance, e.g., time2cig1 = 1 </a:t>
-            </a:r>
-            <a:r>
-              <a:rPr lang="en-US" baseline="0" dirty="0" smtClean="0"/>
-              <a:t>unit of time</a:t>
-            </a:r>
-            <a:r>
-              <a:rPr lang="en-US" baseline="0" dirty="0" smtClean="0"/>
-              <a:t> change from 0 (the first value) since last cigarette, time2cig2 = 2 units of time, etc.</a:t>
+              <a:t> fixed effect variable from the first instance, e.g., time2cig1 = 1 unit of time change from 0 (the first value) since last cigarette, time2cig2 = 2 units of time, etc.</a:t>
             </a:r>
           </a:p>
           <a:p>
@@ -1408,7 +1409,7 @@
           <a:p>
             <a:fld id="{EA779D93-6882-9B42-A8DD-B45D1680E8F1}" type="datetimeFigureOut">
               <a:rPr lang="en-US" smtClean="0"/>
-              <a:t>5/17/18</a:t>
+              <a:t>5/21/18</a:t>
             </a:fld>
             <a:endParaRPr lang="en-US"/>
           </a:p>
@@ -1578,7 +1579,7 @@
           <a:p>
             <a:fld id="{EA779D93-6882-9B42-A8DD-B45D1680E8F1}" type="datetimeFigureOut">
               <a:rPr lang="en-US" smtClean="0"/>
-              <a:t>5/17/18</a:t>
+              <a:t>5/21/18</a:t>
             </a:fld>
             <a:endParaRPr lang="en-US"/>
           </a:p>
@@ -1758,7 +1759,7 @@
           <a:p>
             <a:fld id="{EA779D93-6882-9B42-A8DD-B45D1680E8F1}" type="datetimeFigureOut">
               <a:rPr lang="en-US" smtClean="0"/>
-              <a:t>5/17/18</a:t>
+              <a:t>5/21/18</a:t>
             </a:fld>
             <a:endParaRPr lang="en-US"/>
           </a:p>
@@ -1928,7 +1929,7 @@
           <a:p>
             <a:fld id="{EA779D93-6882-9B42-A8DD-B45D1680E8F1}" type="datetimeFigureOut">
               <a:rPr lang="en-US" smtClean="0"/>
-              <a:t>5/17/18</a:t>
+              <a:t>5/21/18</a:t>
             </a:fld>
             <a:endParaRPr lang="en-US"/>
           </a:p>
@@ -2174,7 +2175,7 @@
           <a:p>
             <a:fld id="{EA779D93-6882-9B42-A8DD-B45D1680E8F1}" type="datetimeFigureOut">
               <a:rPr lang="en-US" smtClean="0"/>
-              <a:t>5/17/18</a:t>
+              <a:t>5/21/18</a:t>
             </a:fld>
             <a:endParaRPr lang="en-US"/>
           </a:p>
@@ -2406,7 +2407,7 @@
           <a:p>
             <a:fld id="{EA779D93-6882-9B42-A8DD-B45D1680E8F1}" type="datetimeFigureOut">
               <a:rPr lang="en-US" smtClean="0"/>
-              <a:t>5/17/18</a:t>
+              <a:t>5/21/18</a:t>
             </a:fld>
             <a:endParaRPr lang="en-US"/>
           </a:p>
@@ -2773,7 +2774,7 @@
           <a:p>
             <a:fld id="{EA779D93-6882-9B42-A8DD-B45D1680E8F1}" type="datetimeFigureOut">
               <a:rPr lang="en-US" smtClean="0"/>
-              <a:t>5/17/18</a:t>
+              <a:t>5/21/18</a:t>
             </a:fld>
             <a:endParaRPr lang="en-US"/>
           </a:p>
@@ -2891,7 +2892,7 @@
           <a:p>
             <a:fld id="{EA779D93-6882-9B42-A8DD-B45D1680E8F1}" type="datetimeFigureOut">
               <a:rPr lang="en-US" smtClean="0"/>
-              <a:t>5/17/18</a:t>
+              <a:t>5/21/18</a:t>
             </a:fld>
             <a:endParaRPr lang="en-US"/>
           </a:p>
@@ -2986,7 +2987,7 @@
           <a:p>
             <a:fld id="{EA779D93-6882-9B42-A8DD-B45D1680E8F1}" type="datetimeFigureOut">
               <a:rPr lang="en-US" smtClean="0"/>
-              <a:t>5/17/18</a:t>
+              <a:t>5/21/18</a:t>
             </a:fld>
             <a:endParaRPr lang="en-US"/>
           </a:p>
@@ -3263,7 +3264,7 @@
           <a:p>
             <a:fld id="{EA779D93-6882-9B42-A8DD-B45D1680E8F1}" type="datetimeFigureOut">
               <a:rPr lang="en-US" smtClean="0"/>
-              <a:t>5/17/18</a:t>
+              <a:t>5/21/18</a:t>
             </a:fld>
             <a:endParaRPr lang="en-US"/>
           </a:p>
@@ -3516,7 +3517,7 @@
           <a:p>
             <a:fld id="{EA779D93-6882-9B42-A8DD-B45D1680E8F1}" type="datetimeFigureOut">
               <a:rPr lang="en-US" smtClean="0"/>
-              <a:t>5/17/18</a:t>
+              <a:t>5/21/18</a:t>
             </a:fld>
             <a:endParaRPr lang="en-US"/>
           </a:p>
@@ -3729,7 +3730,7 @@
           <a:p>
             <a:fld id="{EA779D93-6882-9B42-A8DD-B45D1680E8F1}" type="datetimeFigureOut">
               <a:rPr lang="en-US" smtClean="0"/>
-              <a:t>5/17/18</a:t>
+              <a:t>5/21/18</a:t>
             </a:fld>
             <a:endParaRPr lang="en-US"/>
           </a:p>
@@ -5028,11 +5029,7 @@
             </a:pPr>
             <a:r>
               <a:rPr lang="en-US" dirty="0" smtClean="0"/>
-              <a:t>Proportion looking time </a:t>
-            </a:r>
-            <a:r>
-              <a:rPr lang="en-US" dirty="0" smtClean="0"/>
-              <a:t>~ </a:t>
+              <a:t>Proportion looking time ~ </a:t>
             </a:r>
             <a:r>
               <a:rPr lang="en-US" dirty="0" smtClean="0">
@@ -5241,6 +5238,248 @@
     <p:extLst>
       <p:ext uri="{BB962C8B-B14F-4D97-AF65-F5344CB8AC3E}">
         <p14:creationId xmlns:p14="http://schemas.microsoft.com/office/powerpoint/2010/main" val="1567254732"/>
+      </p:ext>
+    </p:extLst>
+  </p:cSld>
+  <p:clrMapOvr>
+    <a:masterClrMapping/>
+  </p:clrMapOvr>
+</p:sld>
+</file>
+
+<file path=ppt/slides/slide14.xml><?xml version="1.0" encoding="utf-8"?>
+<p:sld xmlns:a="http://schemas.openxmlformats.org/drawingml/2006/main" xmlns:r="http://schemas.openxmlformats.org/officeDocument/2006/relationships" xmlns:p="http://schemas.openxmlformats.org/presentationml/2006/main">
+  <p:cSld>
+    <p:spTree>
+      <p:nvGrpSpPr>
+        <p:cNvPr id="1" name=""/>
+        <p:cNvGrpSpPr/>
+        <p:nvPr/>
+      </p:nvGrpSpPr>
+      <p:grpSpPr>
+        <a:xfrm>
+          <a:off x="0" y="0"/>
+          <a:ext cx="0" cy="0"/>
+          <a:chOff x="0" y="0"/>
+          <a:chExt cx="0" cy="0"/>
+        </a:xfrm>
+      </p:grpSpPr>
+      <p:sp>
+        <p:nvSpPr>
+          <p:cNvPr id="2" name="Title 1"/>
+          <p:cNvSpPr>
+            <a:spLocks noGrp="1"/>
+          </p:cNvSpPr>
+          <p:nvPr>
+            <p:ph type="title"/>
+          </p:nvPr>
+        </p:nvSpPr>
+        <p:spPr/>
+        <p:txBody>
+          <a:bodyPr>
+            <a:normAutofit/>
+          </a:bodyPr>
+          <a:lstStyle/>
+          <a:p>
+            <a:pPr algn="ctr"/>
+            <a:r>
+              <a:rPr lang="en-US" sz="4000" dirty="0" smtClean="0">
+                <a:latin typeface="Arial" charset="0"/>
+                <a:ea typeface="Arial" charset="0"/>
+                <a:cs typeface="Arial" charset="0"/>
+              </a:rPr>
+              <a:t>Breaking down by trial type</a:t>
+            </a:r>
+            <a:endParaRPr lang="en-US" sz="4000" dirty="0">
+              <a:latin typeface="Arial" charset="0"/>
+              <a:ea typeface="Arial" charset="0"/>
+              <a:cs typeface="Arial" charset="0"/>
+            </a:endParaRPr>
+          </a:p>
+        </p:txBody>
+      </p:sp>
+    </p:spTree>
+    <p:extLst>
+      <p:ext uri="{BB962C8B-B14F-4D97-AF65-F5344CB8AC3E}">
+        <p14:creationId xmlns:p14="http://schemas.microsoft.com/office/powerpoint/2010/main" val="1354324987"/>
+      </p:ext>
+    </p:extLst>
+  </p:cSld>
+  <p:clrMapOvr>
+    <a:masterClrMapping/>
+  </p:clrMapOvr>
+</p:sld>
+</file>
+
+<file path=ppt/slides/slide15.xml><?xml version="1.0" encoding="utf-8"?>
+<p:sld xmlns:a="http://schemas.openxmlformats.org/drawingml/2006/main" xmlns:r="http://schemas.openxmlformats.org/officeDocument/2006/relationships" xmlns:p="http://schemas.openxmlformats.org/presentationml/2006/main">
+  <p:cSld>
+    <p:spTree>
+      <p:nvGrpSpPr>
+        <p:cNvPr id="1" name=""/>
+        <p:cNvGrpSpPr/>
+        <p:nvPr/>
+      </p:nvGrpSpPr>
+      <p:grpSpPr>
+        <a:xfrm>
+          <a:off x="0" y="0"/>
+          <a:ext cx="0" cy="0"/>
+          <a:chOff x="0" y="0"/>
+          <a:chExt cx="0" cy="0"/>
+        </a:xfrm>
+      </p:grpSpPr>
+      <p:pic>
+        <p:nvPicPr>
+          <p:cNvPr id="2" name="Picture 1"/>
+          <p:cNvPicPr>
+            <a:picLocks noChangeAspect="1"/>
+          </p:cNvPicPr>
+          <p:nvPr/>
+        </p:nvPicPr>
+        <p:blipFill rotWithShape="1">
+          <a:blip r:embed="rId2">
+            <a:extLst>
+              <a:ext uri="{28A0092B-C50C-407E-A947-70E740481C1C}">
+                <a14:useLocalDpi xmlns:a14="http://schemas.microsoft.com/office/drawing/2010/main" val="0"/>
+              </a:ext>
+            </a:extLst>
+          </a:blip>
+          <a:srcRect l="1199" r="1985" b="4052"/>
+          <a:stretch/>
+        </p:blipFill>
+        <p:spPr>
+          <a:xfrm>
+            <a:off x="2904564" y="125506"/>
+            <a:ext cx="6275294" cy="6580094"/>
+          </a:xfrm>
+          <a:prstGeom prst="rect">
+            <a:avLst/>
+          </a:prstGeom>
+        </p:spPr>
+      </p:pic>
+    </p:spTree>
+    <p:extLst>
+      <p:ext uri="{BB962C8B-B14F-4D97-AF65-F5344CB8AC3E}">
+        <p14:creationId xmlns:p14="http://schemas.microsoft.com/office/powerpoint/2010/main" val="481507868"/>
+      </p:ext>
+    </p:extLst>
+  </p:cSld>
+  <p:clrMapOvr>
+    <a:masterClrMapping/>
+  </p:clrMapOvr>
+</p:sld>
+</file>
+
+<file path=ppt/slides/slide16.xml><?xml version="1.0" encoding="utf-8"?>
+<p:sld xmlns:a="http://schemas.openxmlformats.org/drawingml/2006/main" xmlns:r="http://schemas.openxmlformats.org/officeDocument/2006/relationships" xmlns:p="http://schemas.openxmlformats.org/presentationml/2006/main">
+  <p:cSld>
+    <p:spTree>
+      <p:nvGrpSpPr>
+        <p:cNvPr id="1" name=""/>
+        <p:cNvGrpSpPr/>
+        <p:nvPr/>
+      </p:nvGrpSpPr>
+      <p:grpSpPr>
+        <a:xfrm>
+          <a:off x="0" y="0"/>
+          <a:ext cx="0" cy="0"/>
+          <a:chOff x="0" y="0"/>
+          <a:chExt cx="0" cy="0"/>
+        </a:xfrm>
+      </p:grpSpPr>
+      <p:pic>
+        <p:nvPicPr>
+          <p:cNvPr id="2" name="Picture 1"/>
+          <p:cNvPicPr>
+            <a:picLocks noChangeAspect="1"/>
+          </p:cNvPicPr>
+          <p:nvPr/>
+        </p:nvPicPr>
+        <p:blipFill>
+          <a:blip r:embed="rId2">
+            <a:extLst>
+              <a:ext uri="{28A0092B-C50C-407E-A947-70E740481C1C}">
+                <a14:useLocalDpi xmlns:a14="http://schemas.microsoft.com/office/drawing/2010/main" val="0"/>
+              </a:ext>
+            </a:extLst>
+          </a:blip>
+          <a:stretch>
+            <a:fillRect/>
+          </a:stretch>
+        </p:blipFill>
+        <p:spPr>
+          <a:xfrm>
+            <a:off x="3098800" y="0"/>
+            <a:ext cx="5978001" cy="6858000"/>
+          </a:xfrm>
+          <a:prstGeom prst="rect">
+            <a:avLst/>
+          </a:prstGeom>
+        </p:spPr>
+      </p:pic>
+    </p:spTree>
+    <p:extLst>
+      <p:ext uri="{BB962C8B-B14F-4D97-AF65-F5344CB8AC3E}">
+        <p14:creationId xmlns:p14="http://schemas.microsoft.com/office/powerpoint/2010/main" val="2121399306"/>
+      </p:ext>
+    </p:extLst>
+  </p:cSld>
+  <p:clrMapOvr>
+    <a:masterClrMapping/>
+  </p:clrMapOvr>
+</p:sld>
+</file>
+
+<file path=ppt/slides/slide17.xml><?xml version="1.0" encoding="utf-8"?>
+<p:sld xmlns:a="http://schemas.openxmlformats.org/drawingml/2006/main" xmlns:r="http://schemas.openxmlformats.org/officeDocument/2006/relationships" xmlns:p="http://schemas.openxmlformats.org/presentationml/2006/main">
+  <p:cSld>
+    <p:spTree>
+      <p:nvGrpSpPr>
+        <p:cNvPr id="1" name=""/>
+        <p:cNvGrpSpPr/>
+        <p:nvPr/>
+      </p:nvGrpSpPr>
+      <p:grpSpPr>
+        <a:xfrm>
+          <a:off x="0" y="0"/>
+          <a:ext cx="0" cy="0"/>
+          <a:chOff x="0" y="0"/>
+          <a:chExt cx="0" cy="0"/>
+        </a:xfrm>
+      </p:grpSpPr>
+      <p:pic>
+        <p:nvPicPr>
+          <p:cNvPr id="2" name="Picture 1"/>
+          <p:cNvPicPr>
+            <a:picLocks noChangeAspect="1"/>
+          </p:cNvPicPr>
+          <p:nvPr/>
+        </p:nvPicPr>
+        <p:blipFill rotWithShape="1">
+          <a:blip r:embed="rId2">
+            <a:extLst>
+              <a:ext uri="{28A0092B-C50C-407E-A947-70E740481C1C}">
+                <a14:useLocalDpi xmlns:a14="http://schemas.microsoft.com/office/drawing/2010/main" val="0"/>
+              </a:ext>
+            </a:extLst>
+          </a:blip>
+          <a:srcRect b="8497"/>
+          <a:stretch/>
+        </p:blipFill>
+        <p:spPr>
+          <a:xfrm>
+            <a:off x="2383864" y="0"/>
+            <a:ext cx="7626801" cy="6723529"/>
+          </a:xfrm>
+          <a:prstGeom prst="rect">
+            <a:avLst/>
+          </a:prstGeom>
+        </p:spPr>
+      </p:pic>
+    </p:spTree>
+    <p:extLst>
+      <p:ext uri="{BB962C8B-B14F-4D97-AF65-F5344CB8AC3E}">
+        <p14:creationId xmlns:p14="http://schemas.microsoft.com/office/powerpoint/2010/main" val="245779256"/>
       </p:ext>
     </p:extLst>
   </p:cSld>
@@ -5648,7 +5887,6 @@
               <a:rPr lang="en-US" sz="2000" dirty="0" smtClean="0"/>
               <a:t>+ subject random effects</a:t>
             </a:r>
-            <a:endParaRPr lang="en-US" sz="2000" dirty="0" smtClean="0"/>
           </a:p>
           <a:p>
             <a:endParaRPr lang="en-US" sz="2000" dirty="0" smtClean="0"/>
@@ -5795,11 +6033,7 @@
           <a:p>
             <a:r>
               <a:rPr lang="en-US" dirty="0" smtClean="0"/>
-              <a:t>(1) Proportion of trials chosen </a:t>
-            </a:r>
-            <a:r>
-              <a:rPr lang="en-US" dirty="0" smtClean="0"/>
-              <a:t>~ </a:t>
+              <a:t>(1) Proportion of trials chosen ~ </a:t>
             </a:r>
             <a:r>
               <a:rPr lang="en-US" dirty="0" smtClean="0">
@@ -6109,11 +6343,7 @@
           <a:p>
             <a:r>
               <a:rPr lang="en-US" dirty="0" smtClean="0"/>
-              <a:t>(2) </a:t>
-            </a:r>
-            <a:r>
-              <a:rPr lang="en-US" dirty="0" smtClean="0"/>
-              <a:t>Proportion of trials chosen ~ </a:t>
+              <a:t>(2) Proportion of trials chosen ~ </a:t>
             </a:r>
             <a:r>
               <a:rPr lang="en-US" dirty="0" smtClean="0">
@@ -6139,7 +6369,6 @@
               <a:rPr lang="en-US" dirty="0" smtClean="0"/>
               <a:t>+ subject random effect</a:t>
             </a:r>
-            <a:endParaRPr lang="en-US" dirty="0" smtClean="0"/>
           </a:p>
         </p:txBody>
       </p:sp>

</xml_diff>